<commit_message>
feat: Implement advanced PowerPoint and Word export capabilities with a new PPTX module, centralized output configuration, and updated documentation.
</commit_message>
<xml_diff>
--- a/tools/Test.pptx
+++ b/tools/Test.pptx
@@ -514,94 +514,6 @@
       </p:grpSpPr>
       <p:sp>
         <p:nvSpPr>
-          <p:cNvPr id="7" name="Rectangle 6">
-            <a:extLst>
-              <a:ext uri="{FF2B5EF4-FFF2-40B4-BE49-F238E27FC236}">
-                <a16:creationId xmlns:a16="http://schemas.microsoft.com/office/drawing/2014/main" id="{1F31A4B7-FACF-97BA-1FF2-FA22F86144D3}"/>
-              </a:ext>
-            </a:extLst>
-          </p:cNvPr>
-          <p:cNvSpPr/>
-          <p:nvPr userDrawn="1"/>
-        </p:nvSpPr>
-        <p:spPr>
-          <a:xfrm>
-            <a:off x="0" y="0"/>
-            <a:ext cx="12192000" cy="1333500"/>
-          </a:xfrm>
-          <a:prstGeom prst="rect">
-            <a:avLst/>
-          </a:prstGeom>
-          <a:solidFill>
-            <a:srgbClr val="C00000"/>
-          </a:solidFill>
-        </p:spPr>
-        <p:style>
-          <a:lnRef idx="2">
-            <a:schemeClr val="accent1">
-              <a:shade val="15000"/>
-            </a:schemeClr>
-          </a:lnRef>
-          <a:fillRef idx="1">
-            <a:schemeClr val="accent1"/>
-          </a:fillRef>
-          <a:effectRef idx="0">
-            <a:schemeClr val="accent1"/>
-          </a:effectRef>
-          <a:fontRef idx="minor">
-            <a:schemeClr val="lt1"/>
-          </a:fontRef>
-        </p:style>
-        <p:txBody>
-          <a:bodyPr lIns="360000" rIns="360000" rtlCol="0" anchor="ctr"/>
-          <a:lstStyle/>
-          <a:p>
-            <a:pPr marL="0" marR="0" lvl="0" indent="0" algn="r" defTabSz="914400" rtl="0" eaLnBrk="1" fontAlgn="auto" latinLnBrk="0" hangingPunct="1">
-              <a:lnSpc>
-                <a:spcPct val="100000"/>
-              </a:lnSpc>
-              <a:spcBef>
-                <a:spcPts val="0"/>
-              </a:spcBef>
-              <a:spcAft>
-                <a:spcPts val="0"/>
-              </a:spcAft>
-              <a:buClrTx/>
-              <a:buSzTx/>
-              <a:buFontTx/>
-              <a:buNone/>
-              <a:tabLst/>
-              <a:defRPr/>
-            </a:pPr>
-            <a:r>
-              <a:rPr lang="fr-FR" sz="5400" b="1" dirty="0">
-                <a:solidFill>
-                  <a:schemeClr val="bg1"/>
-                </a:solidFill>
-              </a:rPr>
-              <a:t>{{</a:t>
-            </a:r>
-            <a:r>
-              <a:rPr lang="fr-FR" sz="5400" b="1" dirty="0" err="1">
-                <a:solidFill>
-                  <a:schemeClr val="bg1"/>
-                </a:solidFill>
-              </a:rPr>
-              <a:t>title</a:t>
-            </a:r>
-            <a:r>
-              <a:rPr lang="fr-FR" sz="5400" b="1" dirty="0">
-                <a:solidFill>
-                  <a:schemeClr val="bg1"/>
-                </a:solidFill>
-              </a:rPr>
-              <a:t>}}</a:t>
-            </a:r>
-          </a:p>
-        </p:txBody>
-      </p:sp>
-      <p:sp>
-        <p:nvSpPr>
           <p:cNvPr id="4" name="Espace réservé du texte 3">
             <a:extLst>
               <a:ext uri="{FF2B5EF4-FFF2-40B4-BE49-F238E27FC236}">
@@ -658,6 +570,64 @@
             <a:r>
               <a:rPr lang="fr-FR"/>
               <a:t>Cinquième niveau</a:t>
+            </a:r>
+          </a:p>
+        </p:txBody>
+      </p:sp>
+      <p:sp>
+        <p:nvSpPr>
+          <p:cNvPr id="2" name="ZoneTexte 1">
+            <a:extLst>
+              <a:ext uri="{FF2B5EF4-FFF2-40B4-BE49-F238E27FC236}">
+                <a16:creationId xmlns:a16="http://schemas.microsoft.com/office/drawing/2014/main" id="{027CBB84-5316-05DF-C2AE-B24A648A20D7}"/>
+              </a:ext>
+            </a:extLst>
+          </p:cNvPr>
+          <p:cNvSpPr txBox="1"/>
+          <p:nvPr userDrawn="1"/>
+        </p:nvSpPr>
+        <p:spPr>
+          <a:xfrm>
+            <a:off x="0" y="0"/>
+            <a:ext cx="12192000" cy="979069"/>
+          </a:xfrm>
+          <a:prstGeom prst="rect">
+            <a:avLst/>
+          </a:prstGeom>
+          <a:solidFill>
+            <a:srgbClr val="C00000"/>
+          </a:solidFill>
+        </p:spPr>
+        <p:txBody>
+          <a:bodyPr wrap="square" lIns="540000" tIns="180000" rIns="540000" bIns="180000" rtlCol="0">
+            <a:spAutoFit/>
+          </a:bodyPr>
+          <a:lstStyle/>
+          <a:p>
+            <a:pPr lvl="0" algn="r"/>
+            <a:r>
+              <a:rPr lang="fr-FR" sz="4000" b="1" dirty="0">
+                <a:solidFill>
+                  <a:schemeClr val="bg1"/>
+                </a:solidFill>
+              </a:rPr>
+              <a:t>{{</a:t>
+            </a:r>
+            <a:r>
+              <a:rPr lang="fr-FR" sz="4000" b="1" dirty="0" err="1">
+                <a:solidFill>
+                  <a:schemeClr val="bg1"/>
+                </a:solidFill>
+              </a:rPr>
+              <a:t>title</a:t>
+            </a:r>
+            <a:r>
+              <a:rPr lang="fr-FR" sz="4000" b="1" dirty="0">
+                <a:solidFill>
+                  <a:schemeClr val="bg1"/>
+                </a:solidFill>
+              </a:rPr>
+              <a:t>}}</a:t>
             </a:r>
           </a:p>
         </p:txBody>

</xml_diff>

<commit_message>
feat: Implement deliveries module for report management, supporting Word and PowerPoint output, and updating output configuration.
</commit_message>
<xml_diff>
--- a/tools/Test.pptx
+++ b/tools/Test.pptx
@@ -228,8 +228,8 @@
         </p:nvSpPr>
         <p:spPr>
           <a:xfrm>
-            <a:off x="1363382" y="2986316"/>
-            <a:ext cx="5414683" cy="1015663"/>
+            <a:off x="1243584" y="2986316"/>
+            <a:ext cx="10351008" cy="1015663"/>
           </a:xfrm>
           <a:prstGeom prst="rect">
             <a:avLst/>
@@ -453,8 +453,8 @@
         </p:nvSpPr>
         <p:spPr>
           <a:xfrm>
-            <a:off x="1397000" y="2967335"/>
-            <a:ext cx="3218317" cy="923330"/>
+            <a:off x="1248770" y="2551605"/>
+            <a:ext cx="4469642" cy="1754790"/>
           </a:xfrm>
           <a:prstGeom prst="rect">
             <a:avLst/>
@@ -462,21 +462,21 @@
           <a:noFill/>
         </p:spPr>
         <p:txBody>
-          <a:bodyPr wrap="none" rtlCol="0">
-            <a:spAutoFit/>
+          <a:bodyPr wrap="square" rtlCol="0" anchor="ctr" anchorCtr="0">
+            <a:noAutofit/>
           </a:bodyPr>
           <a:lstStyle/>
           <a:p>
             <a:r>
-              <a:rPr lang="fr-FR" sz="5400" dirty="0"/>
+              <a:rPr lang="fr-FR" sz="3200" b="1" dirty="0"/>
               <a:t>{{</a:t>
             </a:r>
             <a:r>
-              <a:rPr lang="fr-FR" sz="5400" dirty="0" err="1"/>
+              <a:rPr lang="fr-FR" sz="3200" b="1" dirty="0" err="1"/>
               <a:t>chapter</a:t>
             </a:r>
             <a:r>
-              <a:rPr lang="fr-FR" sz="5400" dirty="0"/>
+              <a:rPr lang="fr-FR" sz="3200" b="1" dirty="0"/>
               <a:t>}}</a:t>
             </a:r>
           </a:p>
@@ -530,13 +530,31 @@
         </p:nvSpPr>
         <p:spPr>
           <a:xfrm>
-            <a:off x="392113" y="1611313"/>
-            <a:ext cx="11517312" cy="4862512"/>
+            <a:off x="410401" y="1347217"/>
+            <a:ext cx="11517312" cy="4910282"/>
           </a:xfrm>
         </p:spPr>
         <p:txBody>
-          <a:bodyPr/>
-          <a:lstStyle/>
+          <a:bodyPr>
+            <a:normAutofit/>
+          </a:bodyPr>
+          <a:lstStyle>
+            <a:lvl1pPr>
+              <a:defRPr sz="1800"/>
+            </a:lvl1pPr>
+            <a:lvl2pPr>
+              <a:defRPr sz="1600"/>
+            </a:lvl2pPr>
+            <a:lvl3pPr>
+              <a:defRPr sz="1400"/>
+            </a:lvl3pPr>
+            <a:lvl4pPr>
+              <a:defRPr sz="1200"/>
+            </a:lvl4pPr>
+            <a:lvl5pPr>
+              <a:defRPr sz="1200"/>
+            </a:lvl5pPr>
+          </a:lstStyle>
           <a:p>
             <a:pPr lvl="0"/>
             <a:r>
@@ -629,6 +647,119 @@
               </a:rPr>
               <a:t>}}</a:t>
             </a:r>
+          </a:p>
+        </p:txBody>
+      </p:sp>
+      <p:sp>
+        <p:nvSpPr>
+          <p:cNvPr id="5" name="ZoneTexte 4">
+            <a:extLst>
+              <a:ext uri="{FF2B5EF4-FFF2-40B4-BE49-F238E27FC236}">
+                <a16:creationId xmlns:a16="http://schemas.microsoft.com/office/drawing/2014/main" id="{F4238647-0848-C805-CC8D-AF2894F8C6AD}"/>
+              </a:ext>
+            </a:extLst>
+          </p:cNvPr>
+          <p:cNvSpPr txBox="1"/>
+          <p:nvPr userDrawn="1"/>
+        </p:nvSpPr>
+        <p:spPr>
+          <a:xfrm>
+            <a:off x="134112" y="6426837"/>
+            <a:ext cx="1075936" cy="261610"/>
+          </a:xfrm>
+          <a:prstGeom prst="rect">
+            <a:avLst/>
+          </a:prstGeom>
+          <a:noFill/>
+        </p:spPr>
+        <p:txBody>
+          <a:bodyPr wrap="none" rtlCol="0">
+            <a:spAutoFit/>
+          </a:bodyPr>
+          <a:lstStyle/>
+          <a:p>
+            <a:r>
+              <a:rPr lang="fr-FR" sz="1100" i="1" dirty="0"/>
+              <a:t>Intrinsec - 2026</a:t>
+            </a:r>
+          </a:p>
+        </p:txBody>
+      </p:sp>
+      <p:sp>
+        <p:nvSpPr>
+          <p:cNvPr id="6" name="ZoneTexte 5">
+            <a:extLst>
+              <a:ext uri="{FF2B5EF4-FFF2-40B4-BE49-F238E27FC236}">
+                <a16:creationId xmlns:a16="http://schemas.microsoft.com/office/drawing/2014/main" id="{EC9D0932-510D-670D-8D5A-6276688950BA}"/>
+              </a:ext>
+            </a:extLst>
+          </p:cNvPr>
+          <p:cNvSpPr txBox="1"/>
+          <p:nvPr userDrawn="1"/>
+        </p:nvSpPr>
+        <p:spPr>
+          <a:xfrm>
+            <a:off x="11472695" y="6426837"/>
+            <a:ext cx="585193" cy="261610"/>
+          </a:xfrm>
+          <a:prstGeom prst="rect">
+            <a:avLst/>
+          </a:prstGeom>
+          <a:solidFill>
+            <a:srgbClr val="C00000"/>
+          </a:solidFill>
+        </p:spPr>
+        <p:txBody>
+          <a:bodyPr wrap="square" rtlCol="0">
+            <a:noAutofit/>
+          </a:bodyPr>
+          <a:lstStyle/>
+          <a:p>
+            <a:pPr algn="ctr"/>
+            <a:r>
+              <a:rPr lang="fr-FR" sz="1100" b="1" dirty="0">
+                <a:solidFill>
+                  <a:schemeClr val="bg1"/>
+                </a:solidFill>
+              </a:rPr>
+              <a:t>N°</a:t>
+            </a:r>
+          </a:p>
+        </p:txBody>
+      </p:sp>
+      <p:sp>
+        <p:nvSpPr>
+          <p:cNvPr id="3" name="ZoneTexte 2">
+            <a:extLst>
+              <a:ext uri="{FF2B5EF4-FFF2-40B4-BE49-F238E27FC236}">
+                <a16:creationId xmlns:a16="http://schemas.microsoft.com/office/drawing/2014/main" id="{00AF356D-95BB-A854-20DD-FBEBE234971A}"/>
+              </a:ext>
+            </a:extLst>
+          </p:cNvPr>
+          <p:cNvSpPr txBox="1"/>
+          <p:nvPr userDrawn="1"/>
+        </p:nvSpPr>
+        <p:spPr>
+          <a:xfrm>
+            <a:off x="4863061" y="6426837"/>
+            <a:ext cx="670376" cy="261610"/>
+          </a:xfrm>
+          <a:prstGeom prst="rect">
+            <a:avLst/>
+          </a:prstGeom>
+          <a:noFill/>
+        </p:spPr>
+        <p:txBody>
+          <a:bodyPr wrap="none" rtlCol="0">
+            <a:spAutoFit/>
+          </a:bodyPr>
+          <a:lstStyle/>
+          <a:p>
+            <a:r>
+              <a:rPr lang="fr-FR" sz="1100" i="1"/>
+              <a:t>{{DATE}}</a:t>
+            </a:r>
+            <a:endParaRPr lang="fr-FR" sz="1100" i="1" dirty="0"/>
           </a:p>
         </p:txBody>
       </p:sp>

</xml_diff>